<commit_message>
software install and AHK scripts
</commit_message>
<xml_diff>
--- a/Software/Software Architecture/Pixelcade Architecture.pptx
+++ b/Software/Software Architecture/Pixelcade Architecture.pptx
@@ -104,6 +104,11 @@
       </a:defRPr>
     </a:lvl9pPr>
   </p:defaultTextStyle>
+  <p:extLst>
+    <p:ext uri="{EFAFB233-063F-42B5-8137-9DF3F51BA10A}">
+      <p15:sldGuideLst xmlns:p15="http://schemas.microsoft.com/office/powerpoint/2012/main"/>
+    </p:ext>
+  </p:extLst>
 </p:presentation>
 </file>
 
@@ -254,7 +259,7 @@
           <a:p>
             <a:fld id="{AF9307AF-05C8-1245-B906-2159D6A9B504}" type="datetimeFigureOut">
               <a:rPr lang="en-US" smtClean="0"/>
-              <a:t>6/30/19</a:t>
+              <a:t>1/19/20</a:t>
             </a:fld>
             <a:endParaRPr lang="en-US"/>
           </a:p>
@@ -452,7 +457,7 @@
           <a:p>
             <a:fld id="{AF9307AF-05C8-1245-B906-2159D6A9B504}" type="datetimeFigureOut">
               <a:rPr lang="en-US" smtClean="0"/>
-              <a:t>6/30/19</a:t>
+              <a:t>1/19/20</a:t>
             </a:fld>
             <a:endParaRPr lang="en-US"/>
           </a:p>
@@ -660,7 +665,7 @@
           <a:p>
             <a:fld id="{AF9307AF-05C8-1245-B906-2159D6A9B504}" type="datetimeFigureOut">
               <a:rPr lang="en-US" smtClean="0"/>
-              <a:t>6/30/19</a:t>
+              <a:t>1/19/20</a:t>
             </a:fld>
             <a:endParaRPr lang="en-US"/>
           </a:p>
@@ -858,7 +863,7 @@
           <a:p>
             <a:fld id="{AF9307AF-05C8-1245-B906-2159D6A9B504}" type="datetimeFigureOut">
               <a:rPr lang="en-US" smtClean="0"/>
-              <a:t>6/30/19</a:t>
+              <a:t>1/19/20</a:t>
             </a:fld>
             <a:endParaRPr lang="en-US"/>
           </a:p>
@@ -1133,7 +1138,7 @@
           <a:p>
             <a:fld id="{AF9307AF-05C8-1245-B906-2159D6A9B504}" type="datetimeFigureOut">
               <a:rPr lang="en-US" smtClean="0"/>
-              <a:t>6/30/19</a:t>
+              <a:t>1/19/20</a:t>
             </a:fld>
             <a:endParaRPr lang="en-US"/>
           </a:p>
@@ -1398,7 +1403,7 @@
           <a:p>
             <a:fld id="{AF9307AF-05C8-1245-B906-2159D6A9B504}" type="datetimeFigureOut">
               <a:rPr lang="en-US" smtClean="0"/>
-              <a:t>6/30/19</a:t>
+              <a:t>1/19/20</a:t>
             </a:fld>
             <a:endParaRPr lang="en-US"/>
           </a:p>
@@ -1810,7 +1815,7 @@
           <a:p>
             <a:fld id="{AF9307AF-05C8-1245-B906-2159D6A9B504}" type="datetimeFigureOut">
               <a:rPr lang="en-US" smtClean="0"/>
-              <a:t>6/30/19</a:t>
+              <a:t>1/19/20</a:t>
             </a:fld>
             <a:endParaRPr lang="en-US"/>
           </a:p>
@@ -1951,7 +1956,7 @@
           <a:p>
             <a:fld id="{AF9307AF-05C8-1245-B906-2159D6A9B504}" type="datetimeFigureOut">
               <a:rPr lang="en-US" smtClean="0"/>
-              <a:t>6/30/19</a:t>
+              <a:t>1/19/20</a:t>
             </a:fld>
             <a:endParaRPr lang="en-US"/>
           </a:p>
@@ -2064,7 +2069,7 @@
           <a:p>
             <a:fld id="{AF9307AF-05C8-1245-B906-2159D6A9B504}" type="datetimeFigureOut">
               <a:rPr lang="en-US" smtClean="0"/>
-              <a:t>6/30/19</a:t>
+              <a:t>1/19/20</a:t>
             </a:fld>
             <a:endParaRPr lang="en-US"/>
           </a:p>
@@ -2375,7 +2380,7 @@
           <a:p>
             <a:fld id="{AF9307AF-05C8-1245-B906-2159D6A9B504}" type="datetimeFigureOut">
               <a:rPr lang="en-US" smtClean="0"/>
-              <a:t>6/30/19</a:t>
+              <a:t>1/19/20</a:t>
             </a:fld>
             <a:endParaRPr lang="en-US"/>
           </a:p>
@@ -2663,7 +2668,7 @@
           <a:p>
             <a:fld id="{AF9307AF-05C8-1245-B906-2159D6A9B504}" type="datetimeFigureOut">
               <a:rPr lang="en-US" smtClean="0"/>
-              <a:t>6/30/19</a:t>
+              <a:t>1/19/20</a:t>
             </a:fld>
             <a:endParaRPr lang="en-US"/>
           </a:p>
@@ -2904,7 +2909,7 @@
           <a:p>
             <a:fld id="{AF9307AF-05C8-1245-B906-2159D6A9B504}" type="datetimeFigureOut">
               <a:rPr lang="en-US" smtClean="0"/>
-              <a:t>6/30/19</a:t>
+              <a:t>1/19/20</a:t>
             </a:fld>
             <a:endParaRPr lang="en-US"/>
           </a:p>
@@ -3431,6 +3436,10 @@
           <a:p>
             <a:pPr algn="ctr"/>
             <a:r>
+              <a:rPr lang="en-US" dirty="0"/>
+              <a:t>HUB75 </a:t>
+            </a:r>
+            <a:r>
               <a:rPr lang="en-US" dirty="0">
                 <a:solidFill>
                   <a:schemeClr val="dk1"/>
@@ -3486,6 +3495,17 @@
           <a:p>
             <a:pPr algn="ctr"/>
             <a:r>
+              <a:rPr lang="en-US" dirty="0"/>
+              <a:t>PC or Raspberry Pi</a:t>
+            </a:r>
+          </a:p>
+          <a:p>
+            <a:pPr algn="ctr"/>
+            <a:endParaRPr lang="en-US" dirty="0"/>
+          </a:p>
+          <a:p>
+            <a:pPr algn="ctr"/>
+            <a:r>
               <a:rPr lang="en-US" dirty="0" err="1"/>
               <a:t>Pixelcade</a:t>
             </a:r>
@@ -3493,10 +3513,7 @@
               <a:rPr lang="en-US" dirty="0"/>
               <a:t> Listener</a:t>
             </a:r>
-          </a:p>
-          <a:p>
-            <a:pPr algn="ctr"/>
-            <a:endParaRPr lang="en-US" dirty="0"/>
+            <a:endParaRPr lang="en-US" sz="2000" dirty="0"/>
           </a:p>
           <a:p>
             <a:pPr algn="ctr"/>
@@ -3522,49 +3539,6 @@
           </a:p>
         </p:txBody>
       </p:sp>
-      <p:cxnSp>
-        <p:nvCxnSpPr>
-          <p:cNvPr id="8" name="Straight Arrow Connector 7">
-            <a:extLst>
-              <a:ext uri="{FF2B5EF4-FFF2-40B4-BE49-F238E27FC236}">
-                <a16:creationId xmlns:a16="http://schemas.microsoft.com/office/drawing/2014/main" id="{143053DD-71DD-6D4E-A7F6-067E1274533F}"/>
-              </a:ext>
-            </a:extLst>
-          </p:cNvPr>
-          <p:cNvCxnSpPr>
-            <a:cxnSpLocks/>
-            <a:stCxn id="6" idx="3"/>
-            <a:endCxn id="4" idx="1"/>
-          </p:cNvCxnSpPr>
-          <p:nvPr/>
-        </p:nvCxnSpPr>
-        <p:spPr>
-          <a:xfrm flipV="1">
-            <a:off x="8147895" y="2450294"/>
-            <a:ext cx="650211" cy="1"/>
-          </a:xfrm>
-          <a:prstGeom prst="straightConnector1">
-            <a:avLst/>
-          </a:prstGeom>
-          <a:ln w="25400">
-            <a:tailEnd type="none"/>
-          </a:ln>
-        </p:spPr>
-        <p:style>
-          <a:lnRef idx="1">
-            <a:schemeClr val="dk1"/>
-          </a:lnRef>
-          <a:fillRef idx="0">
-            <a:schemeClr val="dk1"/>
-          </a:fillRef>
-          <a:effectRef idx="0">
-            <a:schemeClr val="dk1"/>
-          </a:effectRef>
-          <a:fontRef idx="minor">
-            <a:schemeClr val="tx1"/>
-          </a:fontRef>
-        </p:style>
-      </p:cxnSp>
       <p:cxnSp>
         <p:nvCxnSpPr>
           <p:cNvPr id="9" name="Straight Arrow Connector 8">
@@ -3969,7 +3943,7 @@
         </p:nvSpPr>
         <p:spPr>
           <a:xfrm>
-            <a:off x="5463258" y="3150988"/>
+            <a:off x="5453657" y="2568557"/>
             <a:ext cx="6096000" cy="646331"/>
           </a:xfrm>
           <a:prstGeom prst="rect">
@@ -3990,10 +3964,7 @@
           </a:p>
           <a:p>
             <a:pPr algn="ctr"/>
-            <a:r>
-              <a:rPr lang="en-US" dirty="0"/>
-              <a:t>Connection</a:t>
-            </a:r>
+            <a:endParaRPr lang="en-US" dirty="0"/>
           </a:p>
         </p:txBody>
       </p:sp>
@@ -4050,13 +4021,15 @@
           </p:cNvPr>
           <p:cNvCxnSpPr>
             <a:cxnSpLocks/>
+            <a:stCxn id="4" idx="1"/>
+            <a:endCxn id="6" idx="3"/>
           </p:cNvCxnSpPr>
           <p:nvPr/>
         </p:nvCxnSpPr>
         <p:spPr>
-          <a:xfrm flipV="1">
-            <a:off x="8511258" y="2522864"/>
-            <a:ext cx="0" cy="613610"/>
+          <a:xfrm flipH="1">
+            <a:off x="8147895" y="2450294"/>
+            <a:ext cx="650211" cy="1"/>
           </a:xfrm>
           <a:prstGeom prst="straightConnector1">
             <a:avLst/>
@@ -4226,6 +4199,453 @@
           </a:p>
         </p:txBody>
       </p:sp>
+      <p:sp>
+        <p:nvSpPr>
+          <p:cNvPr id="21" name="Rectangle 20">
+            <a:extLst>
+              <a:ext uri="{FF2B5EF4-FFF2-40B4-BE49-F238E27FC236}">
+                <a16:creationId xmlns:a16="http://schemas.microsoft.com/office/drawing/2014/main" id="{438ED629-46AE-E942-A1E7-58A4E682DBE1}"/>
+              </a:ext>
+            </a:extLst>
+          </p:cNvPr>
+          <p:cNvSpPr/>
+          <p:nvPr/>
+        </p:nvSpPr>
+        <p:spPr>
+          <a:xfrm>
+            <a:off x="8798106" y="197961"/>
+            <a:ext cx="1158695" cy="1309816"/>
+          </a:xfrm>
+          <a:prstGeom prst="rect">
+            <a:avLst/>
+          </a:prstGeom>
+          <a:ln>
+            <a:headEnd type="none" w="med" len="med"/>
+            <a:tailEnd type="none" w="med" len="med"/>
+          </a:ln>
+        </p:spPr>
+        <p:style>
+          <a:lnRef idx="2">
+            <a:schemeClr val="dk1"/>
+          </a:lnRef>
+          <a:fillRef idx="1">
+            <a:schemeClr val="lt1"/>
+          </a:fillRef>
+          <a:effectRef idx="0">
+            <a:schemeClr val="dk1"/>
+          </a:effectRef>
+          <a:fontRef idx="minor">
+            <a:schemeClr val="dk1"/>
+          </a:fontRef>
+        </p:style>
+        <p:txBody>
+          <a:bodyPr rot="0" spcFirstLastPara="0" vertOverflow="overflow" horzOverflow="overflow" vert="horz" wrap="square" lIns="91440" tIns="45720" rIns="91440" bIns="45720" numCol="1" spcCol="0" rtlCol="0" fromWordArt="0" anchor="ctr" anchorCtr="0" forceAA="0" compatLnSpc="1">
+            <a:prstTxWarp prst="textNoShape">
+              <a:avLst/>
+            </a:prstTxWarp>
+            <a:noAutofit/>
+          </a:bodyPr>
+          <a:lstStyle/>
+          <a:p>
+            <a:pPr algn="ctr"/>
+            <a:r>
+              <a:rPr lang="en-US" dirty="0">
+                <a:solidFill>
+                  <a:schemeClr val="dk1"/>
+                </a:solidFill>
+              </a:rPr>
+              <a:t>Arduino</a:t>
+            </a:r>
+          </a:p>
+        </p:txBody>
+      </p:sp>
+      <p:cxnSp>
+        <p:nvCxnSpPr>
+          <p:cNvPr id="23" name="Straight Arrow Connector 22">
+            <a:extLst>
+              <a:ext uri="{FF2B5EF4-FFF2-40B4-BE49-F238E27FC236}">
+                <a16:creationId xmlns:a16="http://schemas.microsoft.com/office/drawing/2014/main" id="{463A0F0D-F954-9B42-8457-E89D9D658287}"/>
+              </a:ext>
+            </a:extLst>
+          </p:cNvPr>
+          <p:cNvCxnSpPr>
+            <a:cxnSpLocks/>
+            <a:stCxn id="21" idx="1"/>
+          </p:cNvCxnSpPr>
+          <p:nvPr/>
+        </p:nvCxnSpPr>
+        <p:spPr>
+          <a:xfrm flipH="1">
+            <a:off x="7339088" y="852869"/>
+            <a:ext cx="1459018" cy="886224"/>
+          </a:xfrm>
+          <a:prstGeom prst="straightConnector1">
+            <a:avLst/>
+          </a:prstGeom>
+          <a:ln w="25400">
+            <a:tailEnd type="triangle" w="lg" len="med"/>
+          </a:ln>
+        </p:spPr>
+        <p:style>
+          <a:lnRef idx="1">
+            <a:schemeClr val="dk1"/>
+          </a:lnRef>
+          <a:fillRef idx="0">
+            <a:schemeClr val="dk1"/>
+          </a:fillRef>
+          <a:effectRef idx="0">
+            <a:schemeClr val="dk1"/>
+          </a:effectRef>
+          <a:fontRef idx="minor">
+            <a:schemeClr val="tx1"/>
+          </a:fontRef>
+        </p:style>
+      </p:cxnSp>
+      <p:sp>
+        <p:nvSpPr>
+          <p:cNvPr id="29" name="Rectangle 28">
+            <a:extLst>
+              <a:ext uri="{FF2B5EF4-FFF2-40B4-BE49-F238E27FC236}">
+                <a16:creationId xmlns:a16="http://schemas.microsoft.com/office/drawing/2014/main" id="{BB3E9784-B8DE-2043-A8D9-69D6E57BD8AC}"/>
+              </a:ext>
+            </a:extLst>
+          </p:cNvPr>
+          <p:cNvSpPr/>
+          <p:nvPr/>
+        </p:nvSpPr>
+        <p:spPr>
+          <a:xfrm>
+            <a:off x="5371715" y="1295981"/>
+            <a:ext cx="6096000" cy="646331"/>
+          </a:xfrm>
+          <a:prstGeom prst="rect">
+            <a:avLst/>
+          </a:prstGeom>
+        </p:spPr>
+        <p:txBody>
+          <a:bodyPr>
+            <a:spAutoFit/>
+          </a:bodyPr>
+          <a:lstStyle/>
+          <a:p>
+            <a:pPr algn="ctr"/>
+            <a:r>
+              <a:rPr lang="en-US" dirty="0"/>
+              <a:t>USB</a:t>
+            </a:r>
+          </a:p>
+          <a:p>
+            <a:pPr algn="ctr"/>
+            <a:endParaRPr lang="en-US" dirty="0"/>
+          </a:p>
+        </p:txBody>
+      </p:sp>
+      <p:sp>
+        <p:nvSpPr>
+          <p:cNvPr id="30" name="Rectangle 29">
+            <a:extLst>
+              <a:ext uri="{FF2B5EF4-FFF2-40B4-BE49-F238E27FC236}">
+                <a16:creationId xmlns:a16="http://schemas.microsoft.com/office/drawing/2014/main" id="{F1ACC49A-5324-0E4C-84F0-501D207AC7E1}"/>
+              </a:ext>
+            </a:extLst>
+          </p:cNvPr>
+          <p:cNvSpPr/>
+          <p:nvPr/>
+        </p:nvSpPr>
+        <p:spPr>
+          <a:xfrm>
+            <a:off x="10590764" y="76041"/>
+            <a:ext cx="1158695" cy="471775"/>
+          </a:xfrm>
+          <a:prstGeom prst="rect">
+            <a:avLst/>
+          </a:prstGeom>
+          <a:ln>
+            <a:headEnd type="none" w="med" len="med"/>
+            <a:tailEnd type="none" w="med" len="med"/>
+          </a:ln>
+        </p:spPr>
+        <p:style>
+          <a:lnRef idx="2">
+            <a:schemeClr val="dk1"/>
+          </a:lnRef>
+          <a:fillRef idx="1">
+            <a:schemeClr val="lt1"/>
+          </a:fillRef>
+          <a:effectRef idx="0">
+            <a:schemeClr val="dk1"/>
+          </a:effectRef>
+          <a:fontRef idx="minor">
+            <a:schemeClr val="dk1"/>
+          </a:fontRef>
+        </p:style>
+        <p:txBody>
+          <a:bodyPr rot="0" spcFirstLastPara="0" vertOverflow="overflow" horzOverflow="overflow" vert="horz" wrap="square" lIns="91440" tIns="45720" rIns="91440" bIns="45720" numCol="1" spcCol="0" rtlCol="0" fromWordArt="0" anchor="ctr" anchorCtr="0" forceAA="0" compatLnSpc="1">
+            <a:prstTxWarp prst="textNoShape">
+              <a:avLst/>
+            </a:prstTxWarp>
+            <a:noAutofit/>
+          </a:bodyPr>
+          <a:lstStyle/>
+          <a:p>
+            <a:pPr algn="ctr"/>
+            <a:r>
+              <a:rPr lang="en-US" dirty="0"/>
+              <a:t>Mini OLED</a:t>
+            </a:r>
+            <a:endParaRPr lang="en-US" dirty="0">
+              <a:solidFill>
+                <a:schemeClr val="dk1"/>
+              </a:solidFill>
+            </a:endParaRPr>
+          </a:p>
+        </p:txBody>
+      </p:sp>
+      <p:sp>
+        <p:nvSpPr>
+          <p:cNvPr id="35" name="Rectangle 34">
+            <a:extLst>
+              <a:ext uri="{FF2B5EF4-FFF2-40B4-BE49-F238E27FC236}">
+                <a16:creationId xmlns:a16="http://schemas.microsoft.com/office/drawing/2014/main" id="{6C83ABF9-BADA-C14D-BA84-140AF652AA24}"/>
+              </a:ext>
+            </a:extLst>
+          </p:cNvPr>
+          <p:cNvSpPr/>
+          <p:nvPr/>
+        </p:nvSpPr>
+        <p:spPr>
+          <a:xfrm>
+            <a:off x="10610845" y="630959"/>
+            <a:ext cx="1158695" cy="471775"/>
+          </a:xfrm>
+          <a:prstGeom prst="rect">
+            <a:avLst/>
+          </a:prstGeom>
+          <a:ln>
+            <a:headEnd type="none" w="med" len="med"/>
+            <a:tailEnd type="none" w="med" len="med"/>
+          </a:ln>
+        </p:spPr>
+        <p:style>
+          <a:lnRef idx="2">
+            <a:schemeClr val="dk1"/>
+          </a:lnRef>
+          <a:fillRef idx="1">
+            <a:schemeClr val="lt1"/>
+          </a:fillRef>
+          <a:effectRef idx="0">
+            <a:schemeClr val="dk1"/>
+          </a:effectRef>
+          <a:fontRef idx="minor">
+            <a:schemeClr val="dk1"/>
+          </a:fontRef>
+        </p:style>
+        <p:txBody>
+          <a:bodyPr rot="0" spcFirstLastPara="0" vertOverflow="overflow" horzOverflow="overflow" vert="horz" wrap="square" lIns="91440" tIns="45720" rIns="91440" bIns="45720" numCol="1" spcCol="0" rtlCol="0" fromWordArt="0" anchor="ctr" anchorCtr="0" forceAA="0" compatLnSpc="1">
+            <a:prstTxWarp prst="textNoShape">
+              <a:avLst/>
+            </a:prstTxWarp>
+            <a:noAutofit/>
+          </a:bodyPr>
+          <a:lstStyle/>
+          <a:p>
+            <a:pPr algn="ctr"/>
+            <a:r>
+              <a:rPr lang="en-US" sz="1400" dirty="0"/>
+              <a:t>Max7219 7Segment</a:t>
+            </a:r>
+            <a:endParaRPr lang="en-US" sz="1400" dirty="0">
+              <a:solidFill>
+                <a:schemeClr val="dk1"/>
+              </a:solidFill>
+            </a:endParaRPr>
+          </a:p>
+        </p:txBody>
+      </p:sp>
+      <p:sp>
+        <p:nvSpPr>
+          <p:cNvPr id="36" name="Rectangle 35">
+            <a:extLst>
+              <a:ext uri="{FF2B5EF4-FFF2-40B4-BE49-F238E27FC236}">
+                <a16:creationId xmlns:a16="http://schemas.microsoft.com/office/drawing/2014/main" id="{4FB47630-BF6A-4E40-A710-90876D5784AA}"/>
+              </a:ext>
+            </a:extLst>
+          </p:cNvPr>
+          <p:cNvSpPr/>
+          <p:nvPr/>
+        </p:nvSpPr>
+        <p:spPr>
+          <a:xfrm>
+            <a:off x="10589514" y="1148427"/>
+            <a:ext cx="1158695" cy="471775"/>
+          </a:xfrm>
+          <a:prstGeom prst="rect">
+            <a:avLst/>
+          </a:prstGeom>
+          <a:ln>
+            <a:headEnd type="none" w="med" len="med"/>
+            <a:tailEnd type="none" w="med" len="med"/>
+          </a:ln>
+        </p:spPr>
+        <p:style>
+          <a:lnRef idx="2">
+            <a:schemeClr val="dk1"/>
+          </a:lnRef>
+          <a:fillRef idx="1">
+            <a:schemeClr val="lt1"/>
+          </a:fillRef>
+          <a:effectRef idx="0">
+            <a:schemeClr val="dk1"/>
+          </a:effectRef>
+          <a:fontRef idx="minor">
+            <a:schemeClr val="dk1"/>
+          </a:fontRef>
+        </p:style>
+        <p:txBody>
+          <a:bodyPr rot="0" spcFirstLastPara="0" vertOverflow="overflow" horzOverflow="overflow" vert="horz" wrap="square" lIns="91440" tIns="45720" rIns="91440" bIns="45720" numCol="1" spcCol="0" rtlCol="0" fromWordArt="0" anchor="ctr" anchorCtr="0" forceAA="0" compatLnSpc="1">
+            <a:prstTxWarp prst="textNoShape">
+              <a:avLst/>
+            </a:prstTxWarp>
+            <a:noAutofit/>
+          </a:bodyPr>
+          <a:lstStyle/>
+          <a:p>
+            <a:pPr algn="ctr"/>
+            <a:r>
+              <a:rPr lang="en-US" sz="1400" dirty="0"/>
+              <a:t>Max7219 Dot Matrix</a:t>
+            </a:r>
+            <a:endParaRPr lang="en-US" sz="1400" dirty="0">
+              <a:solidFill>
+                <a:schemeClr val="dk1"/>
+              </a:solidFill>
+            </a:endParaRPr>
+          </a:p>
+        </p:txBody>
+      </p:sp>
+      <p:cxnSp>
+        <p:nvCxnSpPr>
+          <p:cNvPr id="37" name="Straight Arrow Connector 36">
+            <a:extLst>
+              <a:ext uri="{FF2B5EF4-FFF2-40B4-BE49-F238E27FC236}">
+                <a16:creationId xmlns:a16="http://schemas.microsoft.com/office/drawing/2014/main" id="{45FCD9CD-9352-9049-A6D8-9CA394095F45}"/>
+              </a:ext>
+            </a:extLst>
+          </p:cNvPr>
+          <p:cNvCxnSpPr>
+            <a:cxnSpLocks/>
+          </p:cNvCxnSpPr>
+          <p:nvPr/>
+        </p:nvCxnSpPr>
+        <p:spPr>
+          <a:xfrm flipV="1">
+            <a:off x="9969940" y="389063"/>
+            <a:ext cx="650211" cy="1"/>
+          </a:xfrm>
+          <a:prstGeom prst="straightConnector1">
+            <a:avLst/>
+          </a:prstGeom>
+          <a:ln w="25400">
+            <a:tailEnd type="none"/>
+          </a:ln>
+        </p:spPr>
+        <p:style>
+          <a:lnRef idx="1">
+            <a:schemeClr val="dk1"/>
+          </a:lnRef>
+          <a:fillRef idx="0">
+            <a:schemeClr val="dk1"/>
+          </a:fillRef>
+          <a:effectRef idx="0">
+            <a:schemeClr val="dk1"/>
+          </a:effectRef>
+          <a:fontRef idx="minor">
+            <a:schemeClr val="tx1"/>
+          </a:fontRef>
+        </p:style>
+      </p:cxnSp>
+      <p:cxnSp>
+        <p:nvCxnSpPr>
+          <p:cNvPr id="38" name="Straight Arrow Connector 37">
+            <a:extLst>
+              <a:ext uri="{FF2B5EF4-FFF2-40B4-BE49-F238E27FC236}">
+                <a16:creationId xmlns:a16="http://schemas.microsoft.com/office/drawing/2014/main" id="{4561B29B-2EE1-5C4A-A107-919805074AE0}"/>
+              </a:ext>
+            </a:extLst>
+          </p:cNvPr>
+          <p:cNvCxnSpPr>
+            <a:cxnSpLocks/>
+          </p:cNvCxnSpPr>
+          <p:nvPr/>
+        </p:nvCxnSpPr>
+        <p:spPr>
+          <a:xfrm flipV="1">
+            <a:off x="9969940" y="906632"/>
+            <a:ext cx="650211" cy="1"/>
+          </a:xfrm>
+          <a:prstGeom prst="straightConnector1">
+            <a:avLst/>
+          </a:prstGeom>
+          <a:ln w="25400">
+            <a:tailEnd type="none"/>
+          </a:ln>
+        </p:spPr>
+        <p:style>
+          <a:lnRef idx="1">
+            <a:schemeClr val="dk1"/>
+          </a:lnRef>
+          <a:fillRef idx="0">
+            <a:schemeClr val="dk1"/>
+          </a:fillRef>
+          <a:effectRef idx="0">
+            <a:schemeClr val="dk1"/>
+          </a:effectRef>
+          <a:fontRef idx="minor">
+            <a:schemeClr val="tx1"/>
+          </a:fontRef>
+        </p:style>
+      </p:cxnSp>
+      <p:cxnSp>
+        <p:nvCxnSpPr>
+          <p:cNvPr id="39" name="Straight Arrow Connector 38">
+            <a:extLst>
+              <a:ext uri="{FF2B5EF4-FFF2-40B4-BE49-F238E27FC236}">
+                <a16:creationId xmlns:a16="http://schemas.microsoft.com/office/drawing/2014/main" id="{95067D9B-77B2-824B-A7BD-7DBF01285874}"/>
+              </a:ext>
+            </a:extLst>
+          </p:cNvPr>
+          <p:cNvCxnSpPr>
+            <a:cxnSpLocks/>
+          </p:cNvCxnSpPr>
+          <p:nvPr/>
+        </p:nvCxnSpPr>
+        <p:spPr>
+          <a:xfrm flipV="1">
+            <a:off x="9969939" y="1341926"/>
+            <a:ext cx="650211" cy="1"/>
+          </a:xfrm>
+          <a:prstGeom prst="straightConnector1">
+            <a:avLst/>
+          </a:prstGeom>
+          <a:ln w="25400">
+            <a:tailEnd type="none"/>
+          </a:ln>
+        </p:spPr>
+        <p:style>
+          <a:lnRef idx="1">
+            <a:schemeClr val="dk1"/>
+          </a:lnRef>
+          <a:fillRef idx="0">
+            <a:schemeClr val="dk1"/>
+          </a:fillRef>
+          <a:effectRef idx="0">
+            <a:schemeClr val="dk1"/>
+          </a:effectRef>
+          <a:fontRef idx="minor">
+            <a:schemeClr val="tx1"/>
+          </a:fontRef>
+        </p:style>
+      </p:cxnSp>
     </p:spTree>
     <p:extLst>
       <p:ext uri="{BB962C8B-B14F-4D97-AF65-F5344CB8AC3E}">

</xml_diff>